<commit_message>
Add info to readme
</commit_message>
<xml_diff>
--- a/images/gfw-figures.pptx
+++ b/images/gfw-figures.pptx
@@ -104,6 +104,11 @@
       </a:defRPr>
     </a:lvl9pPr>
   </p:defaultTextStyle>
+  <p:extLst>
+    <p:ext uri="{EFAFB233-063F-42B5-8137-9DF3F51BA10A}">
+      <p15:sldGuideLst xmlns:p15="http://schemas.microsoft.com/office/powerpoint/2012/main"/>
+    </p:ext>
+  </p:extLst>
 </p:presentation>
 </file>
 
@@ -3372,8 +3377,8 @@
         </p:blipFill>
         <p:spPr>
           <a:xfrm>
-            <a:off x="7817560" y="1464093"/>
-            <a:ext cx="2038259" cy="1045137"/>
+            <a:off x="7886690" y="1468355"/>
+            <a:ext cx="1937794" cy="993622"/>
           </a:xfrm>
           <a:prstGeom prst="rect">
             <a:avLst/>
@@ -3529,8 +3534,8 @@
         </p:blipFill>
         <p:spPr>
           <a:xfrm>
-            <a:off x="9003974" y="3986427"/>
-            <a:ext cx="1086890" cy="413628"/>
+            <a:off x="9003974" y="4016989"/>
+            <a:ext cx="1006579" cy="383065"/>
           </a:xfrm>
           <a:prstGeom prst="rect">
             <a:avLst/>
@@ -3616,8 +3621,8 @@
         </p:blipFill>
         <p:spPr>
           <a:xfrm>
-            <a:off x="9003974" y="4714902"/>
-            <a:ext cx="753484" cy="327275"/>
+            <a:off x="9003974" y="4733019"/>
+            <a:ext cx="650389" cy="282496"/>
           </a:xfrm>
           <a:prstGeom prst="rect">
             <a:avLst/>

</xml_diff>